<commit_message>
KMP and SCC Updates
KMP and SCC Updates
</commit_message>
<xml_diff>
--- a/Backtracking/21 - Backtracking.pptx
+++ b/Backtracking/21 - Backtracking.pptx
@@ -255,7 +255,7 @@
             <a:fld id="{F5CE91A7-7D36-48F8-8968-B2E8F6265043}" type="datetimeFigureOut">
               <a:rPr lang="en-US" smtClean="0"/>
               <a:pPr/>
-              <a:t>22-Dec-22</a:t>
+              <a:t>01-Jan-23</a:t>
             </a:fld>
             <a:endParaRPr lang="en-US"/>
           </a:p>
@@ -873,7 +873,7 @@
             <a:fld id="{5EF9B71C-2D91-4D15-BAB7-ADA66F828B46}" type="datetimeFigureOut">
               <a:rPr lang="id-ID" smtClean="0"/>
               <a:pPr/>
-              <a:t>22/12/2022</a:t>
+              <a:t>01/01/2023</a:t>
             </a:fld>
             <a:endParaRPr lang="id-ID"/>
           </a:p>
@@ -1055,7 +1055,7 @@
             <a:fld id="{5EF9B71C-2D91-4D15-BAB7-ADA66F828B46}" type="datetimeFigureOut">
               <a:rPr lang="id-ID" smtClean="0"/>
               <a:pPr/>
-              <a:t>22/12/2022</a:t>
+              <a:t>01/01/2023</a:t>
             </a:fld>
             <a:endParaRPr lang="id-ID"/>
           </a:p>
@@ -1237,7 +1237,7 @@
             <a:fld id="{5EF9B71C-2D91-4D15-BAB7-ADA66F828B46}" type="datetimeFigureOut">
               <a:rPr lang="id-ID" smtClean="0"/>
               <a:pPr/>
-              <a:t>22/12/2022</a:t>
+              <a:t>01/01/2023</a:t>
             </a:fld>
             <a:endParaRPr lang="id-ID"/>
           </a:p>
@@ -2254,7 +2254,7 @@
             <a:fld id="{5EF9B71C-2D91-4D15-BAB7-ADA66F828B46}" type="datetimeFigureOut">
               <a:rPr lang="id-ID" smtClean="0"/>
               <a:pPr/>
-              <a:t>22/12/2022</a:t>
+              <a:t>01/01/2023</a:t>
             </a:fld>
             <a:endParaRPr lang="id-ID"/>
           </a:p>
@@ -2644,7 +2644,7 @@
             <a:fld id="{5EF9B71C-2D91-4D15-BAB7-ADA66F828B46}" type="datetimeFigureOut">
               <a:rPr lang="id-ID" smtClean="0"/>
               <a:pPr/>
-              <a:t>22/12/2022</a:t>
+              <a:t>01/01/2023</a:t>
             </a:fld>
             <a:endParaRPr lang="id-ID"/>
           </a:p>
@@ -2938,7 +2938,7 @@
             <a:fld id="{5EF9B71C-2D91-4D15-BAB7-ADA66F828B46}" type="datetimeFigureOut">
               <a:rPr lang="id-ID" smtClean="0"/>
               <a:pPr/>
-              <a:t>22/12/2022</a:t>
+              <a:t>01/01/2023</a:t>
             </a:fld>
             <a:endParaRPr lang="id-ID"/>
           </a:p>
@@ -3308,7 +3308,7 @@
             <a:fld id="{5EF9B71C-2D91-4D15-BAB7-ADA66F828B46}" type="datetimeFigureOut">
               <a:rPr lang="id-ID" smtClean="0"/>
               <a:pPr/>
-              <a:t>22/12/2022</a:t>
+              <a:t>01/01/2023</a:t>
             </a:fld>
             <a:endParaRPr lang="id-ID"/>
           </a:p>
@@ -3495,7 +3495,7 @@
             <a:fld id="{5EF9B71C-2D91-4D15-BAB7-ADA66F828B46}" type="datetimeFigureOut">
               <a:rPr lang="id-ID" smtClean="0"/>
               <a:pPr/>
-              <a:t>22/12/2022</a:t>
+              <a:t>01/01/2023</a:t>
             </a:fld>
             <a:endParaRPr lang="id-ID"/>
           </a:p>
@@ -3592,7 +3592,7 @@
             <a:fld id="{5EF9B71C-2D91-4D15-BAB7-ADA66F828B46}" type="datetimeFigureOut">
               <a:rPr lang="id-ID" smtClean="0"/>
               <a:pPr/>
-              <a:t>22/12/2022</a:t>
+              <a:t>01/01/2023</a:t>
             </a:fld>
             <a:endParaRPr lang="id-ID"/>
           </a:p>
@@ -3967,7 +3967,7 @@
             <a:fld id="{5EF9B71C-2D91-4D15-BAB7-ADA66F828B46}" type="datetimeFigureOut">
               <a:rPr lang="id-ID" smtClean="0"/>
               <a:pPr/>
-              <a:t>22/12/2022</a:t>
+              <a:t>01/01/2023</a:t>
             </a:fld>
             <a:endParaRPr lang="id-ID"/>
           </a:p>
@@ -4226,7 +4226,7 @@
             <a:fld id="{5EF9B71C-2D91-4D15-BAB7-ADA66F828B46}" type="datetimeFigureOut">
               <a:rPr lang="id-ID" smtClean="0"/>
               <a:pPr/>
-              <a:t>22/12/2022</a:t>
+              <a:t>01/01/2023</a:t>
             </a:fld>
             <a:endParaRPr lang="id-ID"/>
           </a:p>
@@ -4541,7 +4541,7 @@
             <a:fld id="{5EF9B71C-2D91-4D15-BAB7-ADA66F828B46}" type="datetimeFigureOut">
               <a:rPr lang="id-ID" smtClean="0"/>
               <a:pPr/>
-              <a:t>22/12/2022</a:t>
+              <a:t>01/01/2023</a:t>
             </a:fld>
             <a:endParaRPr lang="id-ID"/>
           </a:p>

</xml_diff>